<commit_message>
More markdown and figures
</commit_message>
<xml_diff>
--- a/presentations/wwwh_data_viz.pptx
+++ b/presentations/wwwh_data_viz.pptx
@@ -3292,7 +3292,7 @@
         <p:spPr>
           <a:xfrm>
             <a:off x="0" y="0"/>
-            <a:ext cx="885240" cy="6857280"/>
+            <a:ext cx="884880" cy="6856920"/>
           </a:xfrm>
           <a:custGeom>
             <a:avLst/>
@@ -3757,7 +3757,7 @@
         <p:spPr>
           <a:xfrm>
             <a:off x="11908440" y="0"/>
-            <a:ext cx="282600" cy="6857280"/>
+            <a:ext cx="282240" cy="6856920"/>
           </a:xfrm>
           <a:prstGeom prst="rect">
             <a:avLst/>
@@ -3793,7 +3793,7 @@
         <p:spPr>
           <a:xfrm>
             <a:off x="3557160" y="631080"/>
-            <a:ext cx="5234760" cy="5228640"/>
+            <a:ext cx="5234400" cy="5228280"/>
           </a:xfrm>
           <a:custGeom>
             <a:avLst/>
@@ -4840,7 +4840,7 @@
         <p:spPr>
           <a:xfrm>
             <a:off x="0" y="0"/>
-            <a:ext cx="282600" cy="6857280"/>
+            <a:ext cx="282240" cy="6856920"/>
           </a:xfrm>
           <a:prstGeom prst="rect">
             <a:avLst/>
@@ -4879,8 +4879,8 @@
         </p:nvSpPr>
         <p:spPr>
           <a:xfrm>
-            <a:off x="1251720" y="382320"/>
-            <a:ext cx="10177560" cy="1491480"/>
+            <a:off x="609480" y="273600"/>
+            <a:ext cx="10972080" cy="1144440"/>
           </a:xfrm>
           <a:prstGeom prst="rect">
             <a:avLst/>
@@ -4930,7 +4930,7 @@
         <p:spPr>
           <a:xfrm>
             <a:off x="609480" y="1604520"/>
-            <a:ext cx="10972440" cy="3977280"/>
+            <a:ext cx="10972080" cy="3976920"/>
           </a:xfrm>
           <a:prstGeom prst="rect">
             <a:avLst/>
@@ -4953,7 +4953,7 @@
               <a:buChar char=""/>
             </a:pPr>
             <a:r>
-              <a:rPr b="0" lang="en-GB" sz="3200" spc="-1" strike="noStrike">
+              <a:rPr b="0" lang="en-GB" sz="1800" spc="-1" strike="noStrike">
                 <a:solidFill>
                   <a:srgbClr val="000000"/>
                 </a:solidFill>
@@ -4966,7 +4966,7 @@
               </a:rPr>
               <a:t>Click to edit the outline text format</a:t>
             </a:r>
-            <a:endParaRPr b="0" lang="en-GB" sz="3200" spc="-1" strike="noStrike">
+            <a:endParaRPr b="0" lang="en-GB" sz="1800" spc="-1" strike="noStrike">
               <a:solidFill>
                 <a:srgbClr val="000000"/>
               </a:solidFill>
@@ -4991,7 +4991,7 @@
               <a:buChar char=""/>
             </a:pPr>
             <a:r>
-              <a:rPr b="0" lang="en-GB" sz="2800" spc="-1" strike="noStrike">
+              <a:rPr b="0" lang="en-GB" sz="1800" spc="-1" strike="noStrike">
                 <a:solidFill>
                   <a:srgbClr val="000000"/>
                 </a:solidFill>
@@ -5004,7 +5004,7 @@
               </a:rPr>
               <a:t>Second Outline Level</a:t>
             </a:r>
-            <a:endParaRPr b="0" lang="en-GB" sz="2800" spc="-1" strike="noStrike">
+            <a:endParaRPr b="0" lang="en-GB" sz="1800" spc="-1" strike="noStrike">
               <a:solidFill>
                 <a:srgbClr val="000000"/>
               </a:solidFill>
@@ -5029,7 +5029,7 @@
               <a:buChar char=""/>
             </a:pPr>
             <a:r>
-              <a:rPr b="0" lang="en-GB" sz="2400" spc="-1" strike="noStrike">
+              <a:rPr b="0" lang="en-GB" sz="1800" spc="-1" strike="noStrike">
                 <a:solidFill>
                   <a:srgbClr val="000000"/>
                 </a:solidFill>
@@ -5042,7 +5042,7 @@
               </a:rPr>
               <a:t>Third Outline Level</a:t>
             </a:r>
-            <a:endParaRPr b="0" lang="en-GB" sz="2400" spc="-1" strike="noStrike">
+            <a:endParaRPr b="0" lang="en-GB" sz="1800" spc="-1" strike="noStrike">
               <a:solidFill>
                 <a:srgbClr val="000000"/>
               </a:solidFill>
@@ -5067,7 +5067,7 @@
               <a:buChar char=""/>
             </a:pPr>
             <a:r>
-              <a:rPr b="0" lang="en-GB" sz="2000" spc="-1" strike="noStrike">
+              <a:rPr b="0" lang="en-GB" sz="1800" spc="-1" strike="noStrike">
                 <a:solidFill>
                   <a:srgbClr val="000000"/>
                 </a:solidFill>
@@ -5080,7 +5080,7 @@
               </a:rPr>
               <a:t>Fourth Outline Level</a:t>
             </a:r>
-            <a:endParaRPr b="0" lang="en-GB" sz="2000" spc="-1" strike="noStrike">
+            <a:endParaRPr b="0" lang="en-GB" sz="1800" spc="-1" strike="noStrike">
               <a:solidFill>
                 <a:srgbClr val="000000"/>
               </a:solidFill>
@@ -5105,7 +5105,7 @@
               <a:buChar char=""/>
             </a:pPr>
             <a:r>
-              <a:rPr b="0" lang="en-GB" sz="2000" spc="-1" strike="noStrike">
+              <a:rPr b="0" lang="en-GB" sz="1800" spc="-1" strike="noStrike">
                 <a:solidFill>
                   <a:srgbClr val="000000"/>
                 </a:solidFill>
@@ -5118,7 +5118,7 @@
               </a:rPr>
               <a:t>Fifth Outline Level</a:t>
             </a:r>
-            <a:endParaRPr b="0" lang="en-GB" sz="2000" spc="-1" strike="noStrike">
+            <a:endParaRPr b="0" lang="en-GB" sz="1800" spc="-1" strike="noStrike">
               <a:solidFill>
                 <a:srgbClr val="000000"/>
               </a:solidFill>
@@ -5143,7 +5143,7 @@
               <a:buChar char=""/>
             </a:pPr>
             <a:r>
-              <a:rPr b="0" lang="en-GB" sz="2000" spc="-1" strike="noStrike">
+              <a:rPr b="0" lang="en-GB" sz="1800" spc="-1" strike="noStrike">
                 <a:solidFill>
                   <a:srgbClr val="000000"/>
                 </a:solidFill>
@@ -5156,7 +5156,7 @@
               </a:rPr>
               <a:t>Sixth Outline Level</a:t>
             </a:r>
-            <a:endParaRPr b="0" lang="en-GB" sz="2000" spc="-1" strike="noStrike">
+            <a:endParaRPr b="0" lang="en-GB" sz="1800" spc="-1" strike="noStrike">
               <a:solidFill>
                 <a:srgbClr val="000000"/>
               </a:solidFill>
@@ -5181,7 +5181,7 @@
               <a:buChar char=""/>
             </a:pPr>
             <a:r>
-              <a:rPr b="0" lang="en-GB" sz="2000" spc="-1" strike="noStrike">
+              <a:rPr b="0" lang="en-GB" sz="1800" spc="-1" strike="noStrike">
                 <a:solidFill>
                   <a:srgbClr val="000000"/>
                 </a:solidFill>
@@ -5194,7 +5194,7 @@
               </a:rPr>
               <a:t>Seventh Outline Level</a:t>
             </a:r>
-            <a:endParaRPr b="0" lang="en-GB" sz="2000" spc="-1" strike="noStrike">
+            <a:endParaRPr b="0" lang="en-GB" sz="1800" spc="-1" strike="noStrike">
               <a:solidFill>
                 <a:srgbClr val="000000"/>
               </a:solidFill>
@@ -5261,7 +5261,7 @@
         <p:spPr>
           <a:xfrm>
             <a:off x="0" y="0"/>
-            <a:ext cx="885240" cy="6857280"/>
+            <a:ext cx="884880" cy="6856920"/>
           </a:xfrm>
           <a:custGeom>
             <a:avLst/>
@@ -5726,7 +5726,7 @@
         <p:spPr>
           <a:xfrm>
             <a:off x="11908440" y="0"/>
-            <a:ext cx="282600" cy="6857280"/>
+            <a:ext cx="282240" cy="6856920"/>
           </a:xfrm>
           <a:prstGeom prst="rect">
             <a:avLst/>
@@ -6141,7 +6141,7 @@
         <p:spPr>
           <a:xfrm>
             <a:off x="1100160" y="2368080"/>
-            <a:ext cx="10057680" cy="1253880"/>
+            <a:ext cx="10057320" cy="1253520"/>
           </a:xfrm>
           <a:prstGeom prst="rect">
             <a:avLst/>
@@ -6166,7 +6166,7 @@
               </a:lnSpc>
             </a:pPr>
             <a:r>
-              <a:rPr b="0" lang="en-GB" sz="10000" spc="795" strike="noStrike" cap="all">
+              <a:rPr b="0" lang="en-GB" sz="10000" spc="792" strike="noStrike" cap="all">
                 <a:solidFill>
                   <a:srgbClr val="0b082e"/>
                 </a:solidFill>
@@ -6176,6 +6176,7 @@
                   </a:solidFill>
                 </a:uFill>
                 <a:latin typeface="Impact"/>
+                <a:ea typeface="DejaVu Sans"/>
               </a:rPr>
               <a:t>DATA VISUALIZATION</a:t>
             </a:r>
@@ -6202,7 +6203,7 @@
         <p:spPr>
           <a:xfrm>
             <a:off x="1100160" y="4930560"/>
-            <a:ext cx="10057680" cy="766440"/>
+            <a:ext cx="10057320" cy="766080"/>
           </a:xfrm>
           <a:prstGeom prst="rect">
             <a:avLst/>
@@ -6232,7 +6233,7 @@
               </a:spcBef>
             </a:pPr>
             <a:r>
-              <a:rPr b="1" lang="en-GB" sz="3600" spc="395" strike="noStrike" cap="all">
+              <a:rPr b="1" lang="en-GB" sz="3600" spc="392" strike="noStrike" cap="all">
                 <a:solidFill>
                   <a:srgbClr val="0b082e"/>
                 </a:solidFill>
@@ -6242,6 +6243,7 @@
                   </a:solidFill>
                 </a:uFill>
                 <a:latin typeface="Gill Sans MT"/>
+                <a:ea typeface="DejaVu Sans"/>
               </a:rPr>
               <a:t>WHY, WHAT, WHERE and how</a:t>
             </a:r>
@@ -6317,7 +6319,7 @@
         <p:spPr>
           <a:xfrm>
             <a:off x="1097280" y="286560"/>
-            <a:ext cx="10057680" cy="697320"/>
+            <a:ext cx="10057320" cy="696960"/>
           </a:xfrm>
           <a:prstGeom prst="rect">
             <a:avLst/>
@@ -6344,7 +6346,7 @@
               </a:lnSpc>
             </a:pPr>
             <a:r>
-              <a:rPr b="0" lang="en-GB" sz="5100" spc="197" strike="noStrike" cap="all">
+              <a:rPr b="0" lang="en-GB" sz="5100" spc="194" strike="noStrike" cap="all">
                 <a:solidFill>
                   <a:srgbClr val="0b082e"/>
                 </a:solidFill>
@@ -6354,6 +6356,7 @@
                   </a:solidFill>
                 </a:uFill>
                 <a:latin typeface="Impact"/>
+                <a:ea typeface="DejaVu Sans"/>
               </a:rPr>
               <a:t>WHY VISUALIZE?</a:t>
             </a:r>
@@ -6384,7 +6387,7 @@
         <p:spPr>
           <a:xfrm>
             <a:off x="7575480" y="3358800"/>
-            <a:ext cx="3200040" cy="2790000"/>
+            <a:ext cx="3199680" cy="2789640"/>
           </a:xfrm>
           <a:prstGeom prst="rect">
             <a:avLst/>
@@ -6407,7 +6410,7 @@
         <p:spPr>
           <a:xfrm>
             <a:off x="1501560" y="1487520"/>
-            <a:ext cx="3175200" cy="2616120"/>
+            <a:ext cx="3174840" cy="2615760"/>
           </a:xfrm>
           <a:prstGeom prst="rect">
             <a:avLst/>
@@ -6430,7 +6433,7 @@
         <p:spPr>
           <a:xfrm>
             <a:off x="5412960" y="3474000"/>
-            <a:ext cx="1426680" cy="1397880"/>
+            <a:ext cx="1426320" cy="1397520"/>
           </a:xfrm>
           <a:prstGeom prst="rect">
             <a:avLst/>
@@ -6449,7 +6452,7 @@
         <p:spPr>
           <a:xfrm>
             <a:off x="2168280" y="4110120"/>
-            <a:ext cx="1842120" cy="364320"/>
+            <a:ext cx="1841760" cy="363960"/>
           </a:xfrm>
           <a:prstGeom prst="rect">
             <a:avLst/>
@@ -6511,7 +6514,7 @@
         <p:spPr>
           <a:xfrm>
             <a:off x="8223840" y="2989440"/>
-            <a:ext cx="1902960" cy="364320"/>
+            <a:ext cx="1902600" cy="363960"/>
           </a:xfrm>
           <a:prstGeom prst="rect">
             <a:avLst/>
@@ -6622,7 +6625,7 @@
         <p:spPr>
           <a:xfrm>
             <a:off x="1251720" y="303120"/>
-            <a:ext cx="10177560" cy="716040"/>
+            <a:ext cx="10177200" cy="715680"/>
           </a:xfrm>
           <a:prstGeom prst="rect">
             <a:avLst/>
@@ -6649,7 +6652,7 @@
               </a:lnSpc>
             </a:pPr>
             <a:r>
-              <a:rPr b="0" lang="en-GB" sz="5100" spc="197" strike="noStrike" cap="all">
+              <a:rPr b="0" lang="en-GB" sz="5100" spc="194" strike="noStrike" cap="all">
                 <a:solidFill>
                   <a:srgbClr val="0b082e"/>
                 </a:solidFill>
@@ -6659,6 +6662,7 @@
                   </a:solidFill>
                 </a:uFill>
                 <a:latin typeface="Impact"/>
+                <a:ea typeface="DejaVu Sans"/>
               </a:rPr>
               <a:t>WHAT I WANT TO SEE?</a:t>
             </a:r>
@@ -6689,7 +6693,7 @@
         <p:spPr>
           <a:xfrm>
             <a:off x="1581480" y="1951920"/>
-            <a:ext cx="3657960" cy="4099680"/>
+            <a:ext cx="3657600" cy="4099320"/>
           </a:xfrm>
           <a:prstGeom prst="rect">
             <a:avLst/>
@@ -6708,7 +6712,7 @@
         <p:spPr>
           <a:xfrm>
             <a:off x="6708600" y="2124720"/>
-            <a:ext cx="4342680" cy="3895200"/>
+            <a:ext cx="4342320" cy="3894840"/>
           </a:xfrm>
           <a:prstGeom prst="rect">
             <a:avLst/>
@@ -6778,7 +6782,7 @@
             </a:endParaRPr>
           </a:p>
           <a:p>
-            <a:pPr marL="285840" indent="-285120" algn="just">
+            <a:pPr marL="285840" indent="-284760" algn="just">
               <a:lnSpc>
                 <a:spcPct val="100000"/>
               </a:lnSpc>
@@ -6849,7 +6853,7 @@
             </a:endParaRPr>
           </a:p>
           <a:p>
-            <a:pPr marL="285840" indent="-285120" algn="just">
+            <a:pPr marL="285840" indent="-284760" algn="just">
               <a:lnSpc>
                 <a:spcPct val="100000"/>
               </a:lnSpc>
@@ -6905,7 +6909,7 @@
             </a:endParaRPr>
           </a:p>
           <a:p>
-            <a:pPr marL="285840" indent="-285120" algn="just">
+            <a:pPr marL="285840" indent="-284760" algn="just">
               <a:lnSpc>
                 <a:spcPct val="100000"/>
               </a:lnSpc>
@@ -6961,7 +6965,7 @@
             </a:endParaRPr>
           </a:p>
           <a:p>
-            <a:pPr marL="285840" indent="-285120" algn="just">
+            <a:pPr marL="285840" indent="-284760" algn="just">
               <a:lnSpc>
                 <a:spcPct val="100000"/>
               </a:lnSpc>
@@ -7131,7 +7135,7 @@
         <p:spPr>
           <a:xfrm>
             <a:off x="7094880" y="1787760"/>
-            <a:ext cx="3657960" cy="4099680"/>
+            <a:ext cx="3657600" cy="4099320"/>
           </a:xfrm>
           <a:prstGeom prst="rect">
             <a:avLst/>
@@ -7150,7 +7154,7 @@
         <p:spPr>
           <a:xfrm>
             <a:off x="2532240" y="554040"/>
-            <a:ext cx="2030400" cy="790920"/>
+            <a:ext cx="2030040" cy="790560"/>
           </a:xfrm>
           <a:prstGeom prst="rect">
             <a:avLst/>
@@ -7212,7 +7216,7 @@
         <p:spPr>
           <a:xfrm>
             <a:off x="7908840" y="554040"/>
-            <a:ext cx="2030400" cy="790920"/>
+            <a:ext cx="2030040" cy="790560"/>
           </a:xfrm>
           <a:prstGeom prst="rect">
             <a:avLst/>
@@ -7278,7 +7282,7 @@
         <p:spPr>
           <a:xfrm>
             <a:off x="1718280" y="1787760"/>
-            <a:ext cx="3657960" cy="4099680"/>
+            <a:ext cx="3657600" cy="4099320"/>
           </a:xfrm>
           <a:prstGeom prst="rect">
             <a:avLst/>
@@ -7346,7 +7350,7 @@
         <p:spPr>
           <a:xfrm>
             <a:off x="8428680" y="1648440"/>
-            <a:ext cx="2434680" cy="4440960"/>
+            <a:ext cx="2434320" cy="4440600"/>
           </a:xfrm>
           <a:prstGeom prst="roundRect">
             <a:avLst>
@@ -7384,7 +7388,7 @@
         <p:spPr>
           <a:xfrm>
             <a:off x="4932360" y="1648440"/>
-            <a:ext cx="2434680" cy="4440960"/>
+            <a:ext cx="2434320" cy="4440600"/>
           </a:xfrm>
           <a:prstGeom prst="roundRect">
             <a:avLst>
@@ -7421,7 +7425,7 @@
         <p:spPr>
           <a:xfrm>
             <a:off x="1436400" y="1648440"/>
-            <a:ext cx="2434680" cy="4440960"/>
+            <a:ext cx="2434320" cy="4440600"/>
           </a:xfrm>
           <a:prstGeom prst="roundRect">
             <a:avLst>
@@ -7459,7 +7463,7 @@
         <p:spPr>
           <a:xfrm>
             <a:off x="1436400" y="177120"/>
-            <a:ext cx="9426960" cy="759960"/>
+            <a:ext cx="9426600" cy="759600"/>
           </a:xfrm>
           <a:prstGeom prst="rect">
             <a:avLst/>
@@ -7486,7 +7490,7 @@
               </a:lnSpc>
             </a:pPr>
             <a:r>
-              <a:rPr b="0" lang="en-GB" sz="5100" spc="197" strike="noStrike" cap="all">
+              <a:rPr b="0" lang="en-GB" sz="5100" spc="194" strike="noStrike" cap="all">
                 <a:solidFill>
                   <a:srgbClr val="0b082e"/>
                 </a:solidFill>
@@ -7496,6 +7500,7 @@
                   </a:solidFill>
                 </a:uFill>
                 <a:latin typeface="Impact"/>
+                <a:ea typeface="DejaVu Sans"/>
               </a:rPr>
               <a:t>WHERE TO START?</a:t>
             </a:r>
@@ -7526,7 +7531,7 @@
         <p:spPr>
           <a:xfrm>
             <a:off x="1644480" y="1977120"/>
-            <a:ext cx="2012760" cy="969480"/>
+            <a:ext cx="2012400" cy="969120"/>
           </a:xfrm>
           <a:prstGeom prst="rect">
             <a:avLst/>
@@ -7549,7 +7554,7 @@
         <p:spPr>
           <a:xfrm>
             <a:off x="1644480" y="4782240"/>
-            <a:ext cx="2012760" cy="960120"/>
+            <a:ext cx="2012400" cy="959760"/>
           </a:xfrm>
           <a:prstGeom prst="rect">
             <a:avLst/>
@@ -7572,7 +7577,7 @@
         <p:spPr>
           <a:xfrm>
             <a:off x="5143680" y="1936440"/>
-            <a:ext cx="2012760" cy="969480"/>
+            <a:ext cx="2012400" cy="969120"/>
           </a:xfrm>
           <a:prstGeom prst="rect">
             <a:avLst/>
@@ -7595,7 +7600,7 @@
         <p:spPr>
           <a:xfrm>
             <a:off x="5143680" y="4782240"/>
-            <a:ext cx="2012760" cy="960120"/>
+            <a:ext cx="2012400" cy="959760"/>
           </a:xfrm>
           <a:prstGeom prst="rect">
             <a:avLst/>
@@ -7618,7 +7623,7 @@
         <p:spPr>
           <a:xfrm>
             <a:off x="5143680" y="3379680"/>
-            <a:ext cx="2012760" cy="969480"/>
+            <a:ext cx="2012400" cy="969120"/>
           </a:xfrm>
           <a:prstGeom prst="rect">
             <a:avLst/>
@@ -7641,7 +7646,7 @@
         <p:spPr>
           <a:xfrm>
             <a:off x="1644480" y="3379680"/>
-            <a:ext cx="2012760" cy="969480"/>
+            <a:ext cx="2012400" cy="969120"/>
           </a:xfrm>
           <a:prstGeom prst="rect">
             <a:avLst/>
@@ -7664,7 +7669,7 @@
         <p:spPr>
           <a:xfrm>
             <a:off x="8639640" y="1936440"/>
-            <a:ext cx="2012760" cy="969480"/>
+            <a:ext cx="2012400" cy="969120"/>
           </a:xfrm>
           <a:prstGeom prst="rect">
             <a:avLst/>
@@ -7687,7 +7692,7 @@
         <p:spPr>
           <a:xfrm>
             <a:off x="8639640" y="3379680"/>
-            <a:ext cx="2012760" cy="969480"/>
+            <a:ext cx="2012400" cy="969120"/>
           </a:xfrm>
           <a:prstGeom prst="rect">
             <a:avLst/>
@@ -7710,7 +7715,7 @@
         <p:spPr>
           <a:xfrm>
             <a:off x="8639640" y="4782240"/>
-            <a:ext cx="2012760" cy="969480"/>
+            <a:ext cx="2012400" cy="969120"/>
           </a:xfrm>
           <a:prstGeom prst="rect">
             <a:avLst/>
@@ -7778,7 +7783,7 @@
         <p:spPr>
           <a:xfrm>
             <a:off x="1251720" y="171360"/>
-            <a:ext cx="10177560" cy="680760"/>
+            <a:ext cx="10177200" cy="680400"/>
           </a:xfrm>
           <a:prstGeom prst="rect">
             <a:avLst/>
@@ -7805,7 +7810,7 @@
               </a:lnSpc>
             </a:pPr>
             <a:r>
-              <a:rPr b="0" lang="en-GB" sz="5100" spc="197" strike="noStrike" cap="all">
+              <a:rPr b="0" lang="en-GB" sz="5100" spc="194" strike="noStrike" cap="all">
                 <a:solidFill>
                   <a:srgbClr val="0b082e"/>
                 </a:solidFill>
@@ -7815,6 +7820,7 @@
                   </a:solidFill>
                 </a:uFill>
                 <a:latin typeface="Impact"/>
+                <a:ea typeface="DejaVu Sans"/>
               </a:rPr>
               <a:t>HOW TO DO IT (PROPERLY)? </a:t>
             </a:r>
@@ -7841,7 +7847,7 @@
         <p:spPr>
           <a:xfrm>
             <a:off x="6802560" y="1884960"/>
-            <a:ext cx="3949920" cy="4744080"/>
+            <a:ext cx="3949560" cy="4743720"/>
           </a:xfrm>
           <a:prstGeom prst="rect">
             <a:avLst/>
@@ -7911,7 +7917,7 @@
             </a:endParaRPr>
           </a:p>
           <a:p>
-            <a:pPr marL="285840" indent="-285120" algn="just">
+            <a:pPr marL="285840" indent="-284760" algn="just">
               <a:lnSpc>
                 <a:spcPct val="100000"/>
               </a:lnSpc>
@@ -7967,7 +7973,7 @@
             </a:endParaRPr>
           </a:p>
           <a:p>
-            <a:pPr marL="285840" indent="-285120" algn="just">
+            <a:pPr marL="285840" indent="-284760" algn="just">
               <a:lnSpc>
                 <a:spcPct val="100000"/>
               </a:lnSpc>
@@ -8023,7 +8029,7 @@
             </a:endParaRPr>
           </a:p>
           <a:p>
-            <a:pPr marL="285840" indent="-285120" algn="just">
+            <a:pPr marL="285840" indent="-284760" algn="just">
               <a:lnSpc>
                 <a:spcPct val="100000"/>
               </a:lnSpc>
@@ -8079,7 +8085,7 @@
             </a:endParaRPr>
           </a:p>
           <a:p>
-            <a:pPr marL="285840" indent="-285120" algn="just">
+            <a:pPr marL="285840" indent="-284760" algn="just">
               <a:lnSpc>
                 <a:spcPct val="100000"/>
               </a:lnSpc>
@@ -8135,7 +8141,7 @@
             </a:endParaRPr>
           </a:p>
           <a:p>
-            <a:pPr marL="285840" indent="-285120" algn="just">
+            <a:pPr marL="285840" indent="-284760" algn="just">
               <a:lnSpc>
                 <a:spcPct val="100000"/>
               </a:lnSpc>
@@ -8256,7 +8262,7 @@
         <p:spPr>
           <a:xfrm>
             <a:off x="1595160" y="1884960"/>
-            <a:ext cx="3663360" cy="4102200"/>
+            <a:ext cx="3663000" cy="4101840"/>
           </a:xfrm>
           <a:prstGeom prst="rect">
             <a:avLst/>
@@ -8317,14 +8323,14 @@
       </p:grpSpPr>
       <p:sp>
         <p:nvSpPr>
-          <p:cNvPr id="113" name="TextShape 1"/>
-          <p:cNvSpPr txBox="1"/>
+          <p:cNvPr id="113" name="CustomShape 1"/>
+          <p:cNvSpPr/>
           <p:nvPr/>
         </p:nvSpPr>
         <p:spPr>
           <a:xfrm>
             <a:off x="2520000" y="288000"/>
-            <a:ext cx="7672320" cy="881640"/>
+            <a:ext cx="7671960" cy="881280"/>
           </a:xfrm>
           <a:prstGeom prst="rect">
             <a:avLst/>
@@ -8334,6 +8340,12 @@
             <a:noFill/>
           </a:ln>
         </p:spPr>
+        <p:style>
+          <a:lnRef idx="0"/>
+          <a:fillRef idx="0"/>
+          <a:effectRef idx="0"/>
+          <a:fontRef idx="minor"/>
+        </p:style>
         <p:txBody>
           <a:bodyPr lIns="90000" rIns="90000" tIns="45000" bIns="45000"/>
           <a:p>
@@ -8343,7 +8355,7 @@
               </a:lnSpc>
             </a:pPr>
             <a:r>
-              <a:rPr b="0" lang="en-GB" sz="5100" spc="197" strike="noStrike" cap="all">
+              <a:rPr b="0" lang="en-GB" sz="5100" spc="194" strike="noStrike" cap="all">
                 <a:solidFill>
                   <a:srgbClr val="0b082e"/>
                 </a:solidFill>
@@ -8372,14 +8384,14 @@
       </p:sp>
       <p:sp>
         <p:nvSpPr>
-          <p:cNvPr id="114" name="TextShape 2"/>
-          <p:cNvSpPr txBox="1"/>
+          <p:cNvPr id="114" name="CustomShape 2"/>
+          <p:cNvSpPr/>
           <p:nvPr/>
         </p:nvSpPr>
         <p:spPr>
           <a:xfrm>
             <a:off x="3456000" y="2469960"/>
-            <a:ext cx="5904000" cy="2138040"/>
+            <a:ext cx="5903640" cy="2137680"/>
           </a:xfrm>
           <a:prstGeom prst="rect">
             <a:avLst/>
@@ -8389,110 +8401,19 @@
             <a:noFill/>
           </a:ln>
         </p:spPr>
+        <p:style>
+          <a:lnRef idx="0"/>
+          <a:fillRef idx="0"/>
+          <a:effectRef idx="0"/>
+          <a:fontRef idx="minor"/>
+        </p:style>
         <p:txBody>
           <a:bodyPr lIns="90000" rIns="90000" tIns="45000" bIns="45000"/>
           <a:p>
-            <a:pPr marL="216000" indent="-216000">
-              <a:buClr>
-                <a:srgbClr val="000000"/>
-              </a:buClr>
-              <a:buSzPct val="45000"/>
-              <a:buFont typeface="Wingdings" charset="2"/>
-              <a:buChar char=""/>
-            </a:pPr>
-            <a:r>
-              <a:rPr b="0" lang="en-GB" sz="1800" spc="-1" strike="noStrike">
-                <a:solidFill>
-                  <a:srgbClr val="000000"/>
-                </a:solidFill>
-                <a:uFill>
-                  <a:solidFill>
-                    <a:srgbClr val="ffffff"/>
-                  </a:solidFill>
-                </a:uFill>
-                <a:latin typeface="Arial"/>
-              </a:rPr>
-              <a:t>Demonstrations on fake data.</a:t>
-            </a:r>
-            <a:br/>
-            <a:r>
-              <a:rPr b="0" lang="en-GB" sz="1800" spc="-1" strike="noStrike">
-                <a:solidFill>
-                  <a:srgbClr val="000000"/>
-                </a:solidFill>
-                <a:uFill>
-                  <a:solidFill>
-                    <a:srgbClr val="ffffff"/>
-                  </a:solidFill>
-                </a:uFill>
-                <a:latin typeface="Arial"/>
-              </a:rPr>
-              <a:t> </a:t>
-            </a:r>
-            <a:endParaRPr b="0" lang="en-GB" sz="1800" spc="-1" strike="noStrike">
-              <a:solidFill>
-                <a:srgbClr val="000000"/>
-              </a:solidFill>
-              <a:uFill>
-                <a:solidFill>
-                  <a:srgbClr val="ffffff"/>
-                </a:solidFill>
-              </a:uFill>
-              <a:latin typeface="Arial"/>
-            </a:endParaRPr>
-          </a:p>
-          <a:p>
-            <a:pPr marL="216000" indent="-216000">
-              <a:buClr>
-                <a:srgbClr val="000000"/>
-              </a:buClr>
-              <a:buSzPct val="45000"/>
-              <a:buFont typeface="Wingdings" charset="2"/>
-              <a:buChar char=""/>
-            </a:pPr>
-            <a:r>
-              <a:rPr b="0" lang="en-GB" sz="1800" spc="-1" strike="noStrike">
-                <a:solidFill>
-                  <a:srgbClr val="000000"/>
-                </a:solidFill>
-                <a:uFill>
-                  <a:solidFill>
-                    <a:srgbClr val="ffffff"/>
-                  </a:solidFill>
-                </a:uFill>
-                <a:latin typeface="Arial"/>
-              </a:rPr>
-              <a:t>Exercises on statistics from a famous MMORPG.</a:t>
-            </a:r>
-            <a:br/>
-            <a:r>
-              <a:rPr b="0" lang="en-GB" sz="1800" spc="-1" strike="noStrike">
-                <a:solidFill>
-                  <a:srgbClr val="000000"/>
-                </a:solidFill>
-                <a:uFill>
-                  <a:solidFill>
-                    <a:srgbClr val="ffffff"/>
-                  </a:solidFill>
-                </a:uFill>
-                <a:latin typeface="Arial"/>
-              </a:rPr>
-              <a:t> </a:t>
-            </a:r>
-            <a:endParaRPr b="0" lang="en-GB" sz="1800" spc="-1" strike="noStrike">
-              <a:solidFill>
-                <a:srgbClr val="000000"/>
-              </a:solidFill>
-              <a:uFill>
-                <a:solidFill>
-                  <a:srgbClr val="ffffff"/>
-                </a:solidFill>
-              </a:uFill>
-              <a:latin typeface="Arial"/>
-            </a:endParaRPr>
-          </a:p>
-          <a:p>
-            <a:pPr marL="216000" indent="-216000">
+            <a:pPr marL="216000" indent="-215640">
+              <a:lnSpc>
+                <a:spcPct val="100000"/>
+              </a:lnSpc>
               <a:buClr>
                 <a:srgbClr val="000000"/>
               </a:buClr>
@@ -8542,7 +8463,10 @@
             </a:endParaRPr>
           </a:p>
           <a:p>
-            <a:pPr marL="216000" indent="-216000">
+            <a:pPr marL="216000" indent="-215640">
+              <a:lnSpc>
+                <a:spcPct val="100000"/>
+              </a:lnSpc>
               <a:buClr>
                 <a:srgbClr val="000000"/>
               </a:buClr>
@@ -8562,7 +8486,7 @@
                 </a:uFill>
                 <a:latin typeface="Arial"/>
               </a:rPr>
-              <a:t>If not able to access the environment read from the html version or follow on the projector</a:t>
+              <a:t>If not able to access the environment read from the html version or follow on the projector.</a:t>
             </a:r>
             <a:endParaRPr b="0" lang="en-GB" sz="1800" spc="-1" strike="noStrike">
               <a:solidFill>
@@ -8580,6 +8504,33 @@
       </p:sp>
     </p:spTree>
   </p:cSld>
+  <p:timing>
+    <p:tnLst>
+      <p:par>
+        <p:cTn id="13" dur="indefinite" restart="never" nodeType="tmRoot">
+          <p:childTnLst>
+            <p:seq>
+              <p:cTn id="14" nodeType="mainSeq"/>
+              <p:prevCondLst>
+                <p:cond delay="0" evt="onPrev">
+                  <p:tgtEl>
+                    <p:sldTgt/>
+                  </p:tgtEl>
+                </p:cond>
+              </p:prevCondLst>
+              <p:nextCondLst>
+                <p:cond delay="0" evt="onNext">
+                  <p:tgtEl>
+                    <p:sldTgt/>
+                  </p:tgtEl>
+                </p:cond>
+              </p:nextCondLst>
+            </p:seq>
+          </p:childTnLst>
+        </p:cTn>
+      </p:par>
+    </p:tnLst>
+  </p:timing>
 </p:sld>
 </file>
 

</xml_diff>

<commit_message>
Cleaning, addedd references, added comments, reviewed markdown
</commit_message>
<xml_diff>
--- a/presentations/wwwh_data_viz.pptx
+++ b/presentations/wwwh_data_viz.pptx
@@ -13,6 +13,7 @@
     <p:sldId id="260" r:id="rId8"/>
     <p:sldId id="261" r:id="rId9"/>
     <p:sldId id="262" r:id="rId10"/>
+    <p:sldId id="263" r:id="rId11"/>
   </p:sldIdLst>
   <p:sldSz cx="12192000" cy="6858000"/>
   <p:notesSz cx="7559675" cy="10691812"/>
@@ -3292,7 +3293,7 @@
         <p:spPr>
           <a:xfrm>
             <a:off x="0" y="0"/>
-            <a:ext cx="884880" cy="6856920"/>
+            <a:ext cx="884520" cy="6856560"/>
           </a:xfrm>
           <a:custGeom>
             <a:avLst/>
@@ -3757,7 +3758,7 @@
         <p:spPr>
           <a:xfrm>
             <a:off x="11908440" y="0"/>
-            <a:ext cx="282240" cy="6856920"/>
+            <a:ext cx="281880" cy="6856560"/>
           </a:xfrm>
           <a:prstGeom prst="rect">
             <a:avLst/>
@@ -3793,7 +3794,7 @@
         <p:spPr>
           <a:xfrm>
             <a:off x="3557160" y="631080"/>
-            <a:ext cx="5234400" cy="5228280"/>
+            <a:ext cx="5234040" cy="5227920"/>
           </a:xfrm>
           <a:custGeom>
             <a:avLst/>
@@ -4840,7 +4841,7 @@
         <p:spPr>
           <a:xfrm>
             <a:off x="0" y="0"/>
-            <a:ext cx="282240" cy="6856920"/>
+            <a:ext cx="281880" cy="6856560"/>
           </a:xfrm>
           <a:prstGeom prst="rect">
             <a:avLst/>
@@ -4880,7 +4881,7 @@
         <p:spPr>
           <a:xfrm>
             <a:off x="609480" y="273600"/>
-            <a:ext cx="10972080" cy="1144440"/>
+            <a:ext cx="10972440" cy="1144800"/>
           </a:xfrm>
           <a:prstGeom prst="rect">
             <a:avLst/>
@@ -4889,8 +4890,9 @@
         <p:txBody>
           <a:bodyPr lIns="0" rIns="0" tIns="0" bIns="0" anchor="ctr"/>
           <a:p>
+            <a:pPr algn="ctr"/>
             <a:r>
-              <a:rPr b="0" lang="en-GB" sz="1800" spc="-1" strike="noStrike">
+              <a:rPr b="0" lang="en-GB" sz="4400" spc="-1" strike="noStrike">
                 <a:solidFill>
                   <a:srgbClr val="000000"/>
                 </a:solidFill>
@@ -4903,7 +4905,7 @@
               </a:rPr>
               <a:t>Click to edit the title text format</a:t>
             </a:r>
-            <a:endParaRPr b="0" lang="en-GB" sz="1800" spc="-1" strike="noStrike">
+            <a:endParaRPr b="0" lang="en-GB" sz="4400" spc="-1" strike="noStrike">
               <a:solidFill>
                 <a:srgbClr val="000000"/>
               </a:solidFill>
@@ -4930,7 +4932,7 @@
         <p:spPr>
           <a:xfrm>
             <a:off x="609480" y="1604520"/>
-            <a:ext cx="10972080" cy="3976920"/>
+            <a:ext cx="10972440" cy="3977280"/>
           </a:xfrm>
           <a:prstGeom prst="rect">
             <a:avLst/>
@@ -4953,7 +4955,7 @@
               <a:buChar char=""/>
             </a:pPr>
             <a:r>
-              <a:rPr b="0" lang="en-GB" sz="1800" spc="-1" strike="noStrike">
+              <a:rPr b="0" lang="en-GB" sz="3200" spc="-1" strike="noStrike">
                 <a:solidFill>
                   <a:srgbClr val="000000"/>
                 </a:solidFill>
@@ -4966,7 +4968,7 @@
               </a:rPr>
               <a:t>Click to edit the outline text format</a:t>
             </a:r>
-            <a:endParaRPr b="0" lang="en-GB" sz="1800" spc="-1" strike="noStrike">
+            <a:endParaRPr b="0" lang="en-GB" sz="3200" spc="-1" strike="noStrike">
               <a:solidFill>
                 <a:srgbClr val="000000"/>
               </a:solidFill>
@@ -4991,7 +4993,7 @@
               <a:buChar char=""/>
             </a:pPr>
             <a:r>
-              <a:rPr b="0" lang="en-GB" sz="1800" spc="-1" strike="noStrike">
+              <a:rPr b="0" lang="en-GB" sz="2800" spc="-1" strike="noStrike">
                 <a:solidFill>
                   <a:srgbClr val="000000"/>
                 </a:solidFill>
@@ -5004,7 +5006,7 @@
               </a:rPr>
               <a:t>Second Outline Level</a:t>
             </a:r>
-            <a:endParaRPr b="0" lang="en-GB" sz="1800" spc="-1" strike="noStrike">
+            <a:endParaRPr b="0" lang="en-GB" sz="2800" spc="-1" strike="noStrike">
               <a:solidFill>
                 <a:srgbClr val="000000"/>
               </a:solidFill>
@@ -5029,7 +5031,7 @@
               <a:buChar char=""/>
             </a:pPr>
             <a:r>
-              <a:rPr b="0" lang="en-GB" sz="1800" spc="-1" strike="noStrike">
+              <a:rPr b="0" lang="en-GB" sz="2400" spc="-1" strike="noStrike">
                 <a:solidFill>
                   <a:srgbClr val="000000"/>
                 </a:solidFill>
@@ -5042,7 +5044,7 @@
               </a:rPr>
               <a:t>Third Outline Level</a:t>
             </a:r>
-            <a:endParaRPr b="0" lang="en-GB" sz="1800" spc="-1" strike="noStrike">
+            <a:endParaRPr b="0" lang="en-GB" sz="2400" spc="-1" strike="noStrike">
               <a:solidFill>
                 <a:srgbClr val="000000"/>
               </a:solidFill>
@@ -5067,7 +5069,7 @@
               <a:buChar char=""/>
             </a:pPr>
             <a:r>
-              <a:rPr b="0" lang="en-GB" sz="1800" spc="-1" strike="noStrike">
+              <a:rPr b="0" lang="en-GB" sz="2000" spc="-1" strike="noStrike">
                 <a:solidFill>
                   <a:srgbClr val="000000"/>
                 </a:solidFill>
@@ -5080,7 +5082,7 @@
               </a:rPr>
               <a:t>Fourth Outline Level</a:t>
             </a:r>
-            <a:endParaRPr b="0" lang="en-GB" sz="1800" spc="-1" strike="noStrike">
+            <a:endParaRPr b="0" lang="en-GB" sz="2000" spc="-1" strike="noStrike">
               <a:solidFill>
                 <a:srgbClr val="000000"/>
               </a:solidFill>
@@ -5105,7 +5107,7 @@
               <a:buChar char=""/>
             </a:pPr>
             <a:r>
-              <a:rPr b="0" lang="en-GB" sz="1800" spc="-1" strike="noStrike">
+              <a:rPr b="0" lang="en-GB" sz="2000" spc="-1" strike="noStrike">
                 <a:solidFill>
                   <a:srgbClr val="000000"/>
                 </a:solidFill>
@@ -5118,7 +5120,7 @@
               </a:rPr>
               <a:t>Fifth Outline Level</a:t>
             </a:r>
-            <a:endParaRPr b="0" lang="en-GB" sz="1800" spc="-1" strike="noStrike">
+            <a:endParaRPr b="0" lang="en-GB" sz="2000" spc="-1" strike="noStrike">
               <a:solidFill>
                 <a:srgbClr val="000000"/>
               </a:solidFill>
@@ -5143,7 +5145,7 @@
               <a:buChar char=""/>
             </a:pPr>
             <a:r>
-              <a:rPr b="0" lang="en-GB" sz="1800" spc="-1" strike="noStrike">
+              <a:rPr b="0" lang="en-GB" sz="2000" spc="-1" strike="noStrike">
                 <a:solidFill>
                   <a:srgbClr val="000000"/>
                 </a:solidFill>
@@ -5156,7 +5158,7 @@
               </a:rPr>
               <a:t>Sixth Outline Level</a:t>
             </a:r>
-            <a:endParaRPr b="0" lang="en-GB" sz="1800" spc="-1" strike="noStrike">
+            <a:endParaRPr b="0" lang="en-GB" sz="2000" spc="-1" strike="noStrike">
               <a:solidFill>
                 <a:srgbClr val="000000"/>
               </a:solidFill>
@@ -5181,7 +5183,7 @@
               <a:buChar char=""/>
             </a:pPr>
             <a:r>
-              <a:rPr b="0" lang="en-GB" sz="1800" spc="-1" strike="noStrike">
+              <a:rPr b="0" lang="en-GB" sz="2000" spc="-1" strike="noStrike">
                 <a:solidFill>
                   <a:srgbClr val="000000"/>
                 </a:solidFill>
@@ -5194,7 +5196,7 @@
               </a:rPr>
               <a:t>Seventh Outline Level</a:t>
             </a:r>
-            <a:endParaRPr b="0" lang="en-GB" sz="1800" spc="-1" strike="noStrike">
+            <a:endParaRPr b="0" lang="en-GB" sz="2000" spc="-1" strike="noStrike">
               <a:solidFill>
                 <a:srgbClr val="000000"/>
               </a:solidFill>
@@ -5261,7 +5263,7 @@
         <p:spPr>
           <a:xfrm>
             <a:off x="0" y="0"/>
-            <a:ext cx="884880" cy="6856920"/>
+            <a:ext cx="884520" cy="6856560"/>
           </a:xfrm>
           <a:custGeom>
             <a:avLst/>
@@ -5726,7 +5728,7 @@
         <p:spPr>
           <a:xfrm>
             <a:off x="11908440" y="0"/>
-            <a:ext cx="282240" cy="6856920"/>
+            <a:ext cx="281880" cy="6856560"/>
           </a:xfrm>
           <a:prstGeom prst="rect">
             <a:avLst/>
@@ -6141,7 +6143,7 @@
         <p:spPr>
           <a:xfrm>
             <a:off x="1100160" y="2368080"/>
-            <a:ext cx="10057320" cy="1253520"/>
+            <a:ext cx="10056960" cy="1253160"/>
           </a:xfrm>
           <a:prstGeom prst="rect">
             <a:avLst/>
@@ -6166,7 +6168,7 @@
               </a:lnSpc>
             </a:pPr>
             <a:r>
-              <a:rPr b="0" lang="en-GB" sz="10000" spc="792" strike="noStrike" cap="all">
+              <a:rPr b="0" lang="en-GB" sz="10000" spc="789" strike="noStrike" cap="all">
                 <a:solidFill>
                   <a:srgbClr val="0b082e"/>
                 </a:solidFill>
@@ -6203,7 +6205,7 @@
         <p:spPr>
           <a:xfrm>
             <a:off x="1100160" y="4930560"/>
-            <a:ext cx="10057320" cy="766080"/>
+            <a:ext cx="10056960" cy="765720"/>
           </a:xfrm>
           <a:prstGeom prst="rect">
             <a:avLst/>
@@ -6233,7 +6235,7 @@
               </a:spcBef>
             </a:pPr>
             <a:r>
-              <a:rPr b="1" lang="en-GB" sz="3600" spc="392" strike="noStrike" cap="all">
+              <a:rPr b="1" lang="en-GB" sz="3600" spc="389" strike="noStrike" cap="all">
                 <a:solidFill>
                   <a:srgbClr val="0b082e"/>
                 </a:solidFill>
@@ -6319,7 +6321,7 @@
         <p:spPr>
           <a:xfrm>
             <a:off x="1097280" y="286560"/>
-            <a:ext cx="10057320" cy="696960"/>
+            <a:ext cx="10056960" cy="696600"/>
           </a:xfrm>
           <a:prstGeom prst="rect">
             <a:avLst/>
@@ -6346,7 +6348,7 @@
               </a:lnSpc>
             </a:pPr>
             <a:r>
-              <a:rPr b="0" lang="en-GB" sz="5100" spc="194" strike="noStrike" cap="all">
+              <a:rPr b="0" lang="en-GB" sz="5100" spc="191" strike="noStrike" cap="all">
                 <a:solidFill>
                   <a:srgbClr val="0b082e"/>
                 </a:solidFill>
@@ -6387,7 +6389,7 @@
         <p:spPr>
           <a:xfrm>
             <a:off x="7575480" y="3358800"/>
-            <a:ext cx="3199680" cy="2789640"/>
+            <a:ext cx="3199320" cy="2789280"/>
           </a:xfrm>
           <a:prstGeom prst="rect">
             <a:avLst/>
@@ -6410,7 +6412,7 @@
         <p:spPr>
           <a:xfrm>
             <a:off x="1501560" y="1487520"/>
-            <a:ext cx="3174840" cy="2615760"/>
+            <a:ext cx="3174480" cy="2615400"/>
           </a:xfrm>
           <a:prstGeom prst="rect">
             <a:avLst/>
@@ -6433,7 +6435,7 @@
         <p:spPr>
           <a:xfrm>
             <a:off x="5412960" y="3474000"/>
-            <a:ext cx="1426320" cy="1397520"/>
+            <a:ext cx="1425960" cy="1397160"/>
           </a:xfrm>
           <a:prstGeom prst="rect">
             <a:avLst/>
@@ -6452,7 +6454,7 @@
         <p:spPr>
           <a:xfrm>
             <a:off x="2168280" y="4110120"/>
-            <a:ext cx="1841760" cy="363960"/>
+            <a:ext cx="1841400" cy="363600"/>
           </a:xfrm>
           <a:prstGeom prst="rect">
             <a:avLst/>
@@ -6514,7 +6516,7 @@
         <p:spPr>
           <a:xfrm>
             <a:off x="8223840" y="2989440"/>
-            <a:ext cx="1902600" cy="363960"/>
+            <a:ext cx="1902240" cy="363600"/>
           </a:xfrm>
           <a:prstGeom prst="rect">
             <a:avLst/>
@@ -6625,7 +6627,7 @@
         <p:spPr>
           <a:xfrm>
             <a:off x="1251720" y="303120"/>
-            <a:ext cx="10177200" cy="715680"/>
+            <a:ext cx="10176840" cy="715320"/>
           </a:xfrm>
           <a:prstGeom prst="rect">
             <a:avLst/>
@@ -6652,7 +6654,7 @@
               </a:lnSpc>
             </a:pPr>
             <a:r>
-              <a:rPr b="0" lang="en-GB" sz="5100" spc="194" strike="noStrike" cap="all">
+              <a:rPr b="0" lang="en-GB" sz="5100" spc="191" strike="noStrike" cap="all">
                 <a:solidFill>
                   <a:srgbClr val="0b082e"/>
                 </a:solidFill>
@@ -6693,7 +6695,7 @@
         <p:spPr>
           <a:xfrm>
             <a:off x="1581480" y="1951920"/>
-            <a:ext cx="3657600" cy="4099320"/>
+            <a:ext cx="3657240" cy="4098960"/>
           </a:xfrm>
           <a:prstGeom prst="rect">
             <a:avLst/>
@@ -6712,7 +6714,7 @@
         <p:spPr>
           <a:xfrm>
             <a:off x="6708600" y="2124720"/>
-            <a:ext cx="4342320" cy="3894840"/>
+            <a:ext cx="4341960" cy="3894480"/>
           </a:xfrm>
           <a:prstGeom prst="rect">
             <a:avLst/>
@@ -6782,7 +6784,7 @@
             </a:endParaRPr>
           </a:p>
           <a:p>
-            <a:pPr marL="285840" indent="-284760" algn="just">
+            <a:pPr marL="285840" indent="-284400" algn="just">
               <a:lnSpc>
                 <a:spcPct val="100000"/>
               </a:lnSpc>
@@ -6853,7 +6855,7 @@
             </a:endParaRPr>
           </a:p>
           <a:p>
-            <a:pPr marL="285840" indent="-284760" algn="just">
+            <a:pPr marL="285840" indent="-284400" algn="just">
               <a:lnSpc>
                 <a:spcPct val="100000"/>
               </a:lnSpc>
@@ -6909,7 +6911,7 @@
             </a:endParaRPr>
           </a:p>
           <a:p>
-            <a:pPr marL="285840" indent="-284760" algn="just">
+            <a:pPr marL="285840" indent="-284400" algn="just">
               <a:lnSpc>
                 <a:spcPct val="100000"/>
               </a:lnSpc>
@@ -6965,7 +6967,7 @@
             </a:endParaRPr>
           </a:p>
           <a:p>
-            <a:pPr marL="285840" indent="-284760" algn="just">
+            <a:pPr marL="285840" indent="-284400" algn="just">
               <a:lnSpc>
                 <a:spcPct val="100000"/>
               </a:lnSpc>
@@ -7135,7 +7137,7 @@
         <p:spPr>
           <a:xfrm>
             <a:off x="7094880" y="1787760"/>
-            <a:ext cx="3657600" cy="4099320"/>
+            <a:ext cx="3657240" cy="4098960"/>
           </a:xfrm>
           <a:prstGeom prst="rect">
             <a:avLst/>
@@ -7154,7 +7156,7 @@
         <p:spPr>
           <a:xfrm>
             <a:off x="2532240" y="554040"/>
-            <a:ext cx="2030040" cy="790560"/>
+            <a:ext cx="2029680" cy="790200"/>
           </a:xfrm>
           <a:prstGeom prst="rect">
             <a:avLst/>
@@ -7216,7 +7218,7 @@
         <p:spPr>
           <a:xfrm>
             <a:off x="7908840" y="554040"/>
-            <a:ext cx="2030040" cy="790560"/>
+            <a:ext cx="2029680" cy="790200"/>
           </a:xfrm>
           <a:prstGeom prst="rect">
             <a:avLst/>
@@ -7282,7 +7284,7 @@
         <p:spPr>
           <a:xfrm>
             <a:off x="1718280" y="1787760"/>
-            <a:ext cx="3657600" cy="4099320"/>
+            <a:ext cx="3657240" cy="4098960"/>
           </a:xfrm>
           <a:prstGeom prst="rect">
             <a:avLst/>
@@ -7292,6 +7294,108 @@
           </a:ln>
         </p:spPr>
       </p:pic>
+      <p:sp>
+        <p:nvSpPr>
+          <p:cNvPr id="97" name="TextShape 3"/>
+          <p:cNvSpPr txBox="1"/>
+          <p:nvPr/>
+        </p:nvSpPr>
+        <p:spPr>
+          <a:xfrm>
+            <a:off x="1944000" y="6120000"/>
+            <a:ext cx="2952000" cy="355680"/>
+          </a:xfrm>
+          <a:prstGeom prst="rect">
+            <a:avLst/>
+          </a:prstGeom>
+          <a:noFill/>
+          <a:ln>
+            <a:noFill/>
+          </a:ln>
+        </p:spPr>
+        <p:txBody>
+          <a:bodyPr lIns="90000" rIns="90000" tIns="45000" bIns="45000"/>
+          <a:p>
+            <a:pPr algn="ctr"/>
+            <a:r>
+              <a:rPr b="0" lang="en-GB" sz="1800" spc="-1" strike="noStrike">
+                <a:solidFill>
+                  <a:srgbClr val="000000"/>
+                </a:solidFill>
+                <a:uFill>
+                  <a:solidFill>
+                    <a:srgbClr val="ffffff"/>
+                  </a:solidFill>
+                </a:uFill>
+                <a:latin typeface="Gill Sans MT"/>
+              </a:rPr>
+              <a:t>Levy et al. (2011)</a:t>
+            </a:r>
+            <a:endParaRPr b="0" lang="en-GB" sz="1800" spc="-1" strike="noStrike">
+              <a:solidFill>
+                <a:srgbClr val="000000"/>
+              </a:solidFill>
+              <a:uFill>
+                <a:solidFill>
+                  <a:srgbClr val="ffffff"/>
+                </a:solidFill>
+              </a:uFill>
+              <a:latin typeface="Gill Sans MT"/>
+            </a:endParaRPr>
+          </a:p>
+        </p:txBody>
+      </p:sp>
+      <p:sp>
+        <p:nvSpPr>
+          <p:cNvPr id="98" name="TextShape 4"/>
+          <p:cNvSpPr txBox="1"/>
+          <p:nvPr/>
+        </p:nvSpPr>
+        <p:spPr>
+          <a:xfrm>
+            <a:off x="7488000" y="6120000"/>
+            <a:ext cx="2952000" cy="355680"/>
+          </a:xfrm>
+          <a:prstGeom prst="rect">
+            <a:avLst/>
+          </a:prstGeom>
+          <a:noFill/>
+          <a:ln>
+            <a:noFill/>
+          </a:ln>
+        </p:spPr>
+        <p:txBody>
+          <a:bodyPr lIns="90000" rIns="90000" tIns="45000" bIns="45000"/>
+          <a:p>
+            <a:pPr algn="ctr"/>
+            <a:r>
+              <a:rPr b="0" lang="en-GB" sz="1800" spc="-1" strike="noStrike">
+                <a:solidFill>
+                  <a:srgbClr val="000000"/>
+                </a:solidFill>
+                <a:uFill>
+                  <a:solidFill>
+                    <a:srgbClr val="ffffff"/>
+                  </a:solidFill>
+                </a:uFill>
+                <a:latin typeface="Gill Sans MT"/>
+              </a:rPr>
+              <a:t>Gelman et al. (2013)</a:t>
+            </a:r>
+            <a:endParaRPr b="0" lang="en-GB" sz="1800" spc="-1" strike="noStrike">
+              <a:solidFill>
+                <a:srgbClr val="000000"/>
+              </a:solidFill>
+              <a:uFill>
+                <a:solidFill>
+                  <a:srgbClr val="ffffff"/>
+                </a:solidFill>
+              </a:uFill>
+              <a:latin typeface="Gill Sans MT"/>
+            </a:endParaRPr>
+          </a:p>
+        </p:txBody>
+      </p:sp>
     </p:spTree>
   </p:cSld>
   <p:timing>
@@ -7343,14 +7447,14 @@
       </p:grpSpPr>
       <p:sp>
         <p:nvSpPr>
-          <p:cNvPr id="97" name="CustomShape 1"/>
+          <p:cNvPr id="99" name="CustomShape 1"/>
           <p:cNvSpPr/>
           <p:nvPr/>
         </p:nvSpPr>
         <p:spPr>
           <a:xfrm>
             <a:off x="8428680" y="1648440"/>
-            <a:ext cx="2434320" cy="4440600"/>
+            <a:ext cx="2433960" cy="4440240"/>
           </a:xfrm>
           <a:prstGeom prst="roundRect">
             <a:avLst>
@@ -7381,14 +7485,14 @@
       </p:sp>
       <p:sp>
         <p:nvSpPr>
-          <p:cNvPr id="98" name="CustomShape 2"/>
+          <p:cNvPr id="100" name="CustomShape 2"/>
           <p:cNvSpPr/>
           <p:nvPr/>
         </p:nvSpPr>
         <p:spPr>
           <a:xfrm>
             <a:off x="4932360" y="1648440"/>
-            <a:ext cx="2434320" cy="4440600"/>
+            <a:ext cx="2433960" cy="4440240"/>
           </a:xfrm>
           <a:prstGeom prst="roundRect">
             <a:avLst>
@@ -7418,14 +7522,14 @@
       </p:sp>
       <p:sp>
         <p:nvSpPr>
-          <p:cNvPr id="99" name="CustomShape 3"/>
+          <p:cNvPr id="101" name="CustomShape 3"/>
           <p:cNvSpPr/>
           <p:nvPr/>
         </p:nvSpPr>
         <p:spPr>
           <a:xfrm>
             <a:off x="1436400" y="1648440"/>
-            <a:ext cx="2434320" cy="4440600"/>
+            <a:ext cx="2433960" cy="4440240"/>
           </a:xfrm>
           <a:prstGeom prst="roundRect">
             <a:avLst>
@@ -7456,14 +7560,14 @@
       </p:sp>
       <p:sp>
         <p:nvSpPr>
-          <p:cNvPr id="100" name="CustomShape 4"/>
+          <p:cNvPr id="102" name="CustomShape 4"/>
           <p:cNvSpPr/>
           <p:nvPr/>
         </p:nvSpPr>
         <p:spPr>
           <a:xfrm>
             <a:off x="1436400" y="177120"/>
-            <a:ext cx="9426600" cy="759600"/>
+            <a:ext cx="9426240" cy="759240"/>
           </a:xfrm>
           <a:prstGeom prst="rect">
             <a:avLst/>
@@ -7490,7 +7594,7 @@
               </a:lnSpc>
             </a:pPr>
             <a:r>
-              <a:rPr b="0" lang="en-GB" sz="5100" spc="194" strike="noStrike" cap="all">
+              <a:rPr b="0" lang="en-GB" sz="5100" spc="191" strike="noStrike" cap="all">
                 <a:solidFill>
                   <a:srgbClr val="0b082e"/>
                 </a:solidFill>
@@ -7520,7 +7624,7 @@
       </p:sp>
       <p:pic>
         <p:nvPicPr>
-          <p:cNvPr id="101" name="Content Placeholder 4" descr=""/>
+          <p:cNvPr id="103" name="Content Placeholder 4" descr=""/>
           <p:cNvPicPr/>
           <p:nvPr/>
         </p:nvPicPr>
@@ -7531,7 +7635,7 @@
         <p:spPr>
           <a:xfrm>
             <a:off x="1644480" y="1977120"/>
-            <a:ext cx="2012400" cy="969120"/>
+            <a:ext cx="2012040" cy="968760"/>
           </a:xfrm>
           <a:prstGeom prst="rect">
             <a:avLst/>
@@ -7543,7 +7647,7 @@
       </p:pic>
       <p:pic>
         <p:nvPicPr>
-          <p:cNvPr id="102" name="Picture 5" descr=""/>
+          <p:cNvPr id="104" name="Picture 5" descr=""/>
           <p:cNvPicPr/>
           <p:nvPr/>
         </p:nvPicPr>
@@ -7554,7 +7658,7 @@
         <p:spPr>
           <a:xfrm>
             <a:off x="1644480" y="4782240"/>
-            <a:ext cx="2012400" cy="959760"/>
+            <a:ext cx="2012040" cy="959400"/>
           </a:xfrm>
           <a:prstGeom prst="rect">
             <a:avLst/>
@@ -7566,7 +7670,7 @@
       </p:pic>
       <p:pic>
         <p:nvPicPr>
-          <p:cNvPr id="103" name="Picture 7" descr=""/>
+          <p:cNvPr id="105" name="Picture 7" descr=""/>
           <p:cNvPicPr/>
           <p:nvPr/>
         </p:nvPicPr>
@@ -7577,7 +7681,7 @@
         <p:spPr>
           <a:xfrm>
             <a:off x="5143680" y="1936440"/>
-            <a:ext cx="2012400" cy="969120"/>
+            <a:ext cx="2012040" cy="968760"/>
           </a:xfrm>
           <a:prstGeom prst="rect">
             <a:avLst/>
@@ -7589,7 +7693,7 @@
       </p:pic>
       <p:pic>
         <p:nvPicPr>
-          <p:cNvPr id="104" name="Picture 9" descr=""/>
+          <p:cNvPr id="106" name="Picture 9" descr=""/>
           <p:cNvPicPr/>
           <p:nvPr/>
         </p:nvPicPr>
@@ -7600,7 +7704,7 @@
         <p:spPr>
           <a:xfrm>
             <a:off x="5143680" y="4782240"/>
-            <a:ext cx="2012400" cy="959760"/>
+            <a:ext cx="2012040" cy="959400"/>
           </a:xfrm>
           <a:prstGeom prst="rect">
             <a:avLst/>
@@ -7612,7 +7716,7 @@
       </p:pic>
       <p:pic>
         <p:nvPicPr>
-          <p:cNvPr id="105" name="Picture 10" descr=""/>
+          <p:cNvPr id="107" name="Picture 10" descr=""/>
           <p:cNvPicPr/>
           <p:nvPr/>
         </p:nvPicPr>
@@ -7623,7 +7727,7 @@
         <p:spPr>
           <a:xfrm>
             <a:off x="5143680" y="3379680"/>
-            <a:ext cx="2012400" cy="969120"/>
+            <a:ext cx="2012040" cy="968760"/>
           </a:xfrm>
           <a:prstGeom prst="rect">
             <a:avLst/>
@@ -7635,7 +7739,7 @@
       </p:pic>
       <p:pic>
         <p:nvPicPr>
-          <p:cNvPr id="106" name="Picture 11" descr=""/>
+          <p:cNvPr id="108" name="Picture 11" descr=""/>
           <p:cNvPicPr/>
           <p:nvPr/>
         </p:nvPicPr>
@@ -7646,7 +7750,7 @@
         <p:spPr>
           <a:xfrm>
             <a:off x="1644480" y="3379680"/>
-            <a:ext cx="2012400" cy="969120"/>
+            <a:ext cx="2012040" cy="968760"/>
           </a:xfrm>
           <a:prstGeom prst="rect">
             <a:avLst/>
@@ -7658,7 +7762,7 @@
       </p:pic>
       <p:pic>
         <p:nvPicPr>
-          <p:cNvPr id="107" name="Picture 12" descr=""/>
+          <p:cNvPr id="109" name="Picture 12" descr=""/>
           <p:cNvPicPr/>
           <p:nvPr/>
         </p:nvPicPr>
@@ -7669,7 +7773,7 @@
         <p:spPr>
           <a:xfrm>
             <a:off x="8639640" y="1936440"/>
-            <a:ext cx="2012400" cy="969120"/>
+            <a:ext cx="2012040" cy="968760"/>
           </a:xfrm>
           <a:prstGeom prst="rect">
             <a:avLst/>
@@ -7681,7 +7785,7 @@
       </p:pic>
       <p:pic>
         <p:nvPicPr>
-          <p:cNvPr id="108" name="Picture 13" descr=""/>
+          <p:cNvPr id="110" name="Picture 13" descr=""/>
           <p:cNvPicPr/>
           <p:nvPr/>
         </p:nvPicPr>
@@ -7692,7 +7796,7 @@
         <p:spPr>
           <a:xfrm>
             <a:off x="8639640" y="3379680"/>
-            <a:ext cx="2012400" cy="969120"/>
+            <a:ext cx="2012040" cy="968760"/>
           </a:xfrm>
           <a:prstGeom prst="rect">
             <a:avLst/>
@@ -7704,7 +7808,7 @@
       </p:pic>
       <p:pic>
         <p:nvPicPr>
-          <p:cNvPr id="109" name="Picture 14" descr=""/>
+          <p:cNvPr id="111" name="Picture 14" descr=""/>
           <p:cNvPicPr/>
           <p:nvPr/>
         </p:nvPicPr>
@@ -7715,7 +7819,7 @@
         <p:spPr>
           <a:xfrm>
             <a:off x="8639640" y="4782240"/>
-            <a:ext cx="2012400" cy="969120"/>
+            <a:ext cx="2012040" cy="968760"/>
           </a:xfrm>
           <a:prstGeom prst="rect">
             <a:avLst/>
@@ -7776,14 +7880,14 @@
       </p:grpSpPr>
       <p:sp>
         <p:nvSpPr>
-          <p:cNvPr id="110" name="CustomShape 1"/>
+          <p:cNvPr id="112" name="CustomShape 1"/>
           <p:cNvSpPr/>
           <p:nvPr/>
         </p:nvSpPr>
         <p:spPr>
           <a:xfrm>
             <a:off x="1251720" y="171360"/>
-            <a:ext cx="10177200" cy="680400"/>
+            <a:ext cx="10176840" cy="680040"/>
           </a:xfrm>
           <a:prstGeom prst="rect">
             <a:avLst/>
@@ -7810,7 +7914,7 @@
               </a:lnSpc>
             </a:pPr>
             <a:r>
-              <a:rPr b="0" lang="en-GB" sz="5100" spc="194" strike="noStrike" cap="all">
+              <a:rPr b="0" lang="en-GB" sz="5100" spc="191" strike="noStrike" cap="all">
                 <a:solidFill>
                   <a:srgbClr val="0b082e"/>
                 </a:solidFill>
@@ -7840,14 +7944,14 @@
       </p:sp>
       <p:sp>
         <p:nvSpPr>
-          <p:cNvPr id="111" name="CustomShape 2"/>
+          <p:cNvPr id="113" name="CustomShape 2"/>
           <p:cNvSpPr/>
           <p:nvPr/>
         </p:nvSpPr>
         <p:spPr>
           <a:xfrm>
             <a:off x="6802560" y="1884960"/>
-            <a:ext cx="3949560" cy="4743720"/>
+            <a:ext cx="3949200" cy="4743360"/>
           </a:xfrm>
           <a:prstGeom prst="rect">
             <a:avLst/>
@@ -7917,7 +8021,7 @@
             </a:endParaRPr>
           </a:p>
           <a:p>
-            <a:pPr marL="285840" indent="-284760" algn="just">
+            <a:pPr marL="285840" indent="-284400" algn="just">
               <a:lnSpc>
                 <a:spcPct val="100000"/>
               </a:lnSpc>
@@ -7973,7 +8077,7 @@
             </a:endParaRPr>
           </a:p>
           <a:p>
-            <a:pPr marL="285840" indent="-284760" algn="just">
+            <a:pPr marL="285840" indent="-284400" algn="just">
               <a:lnSpc>
                 <a:spcPct val="100000"/>
               </a:lnSpc>
@@ -8029,7 +8133,7 @@
             </a:endParaRPr>
           </a:p>
           <a:p>
-            <a:pPr marL="285840" indent="-284760" algn="just">
+            <a:pPr marL="285840" indent="-284400" algn="just">
               <a:lnSpc>
                 <a:spcPct val="100000"/>
               </a:lnSpc>
@@ -8085,7 +8189,7 @@
             </a:endParaRPr>
           </a:p>
           <a:p>
-            <a:pPr marL="285840" indent="-284760" algn="just">
+            <a:pPr marL="285840" indent="-284400" algn="just">
               <a:lnSpc>
                 <a:spcPct val="100000"/>
               </a:lnSpc>
@@ -8141,7 +8245,7 @@
             </a:endParaRPr>
           </a:p>
           <a:p>
-            <a:pPr marL="285840" indent="-284760" algn="just">
+            <a:pPr marL="285840" indent="-284400" algn="just">
               <a:lnSpc>
                 <a:spcPct val="100000"/>
               </a:lnSpc>
@@ -8251,7 +8355,7 @@
       </p:sp>
       <p:pic>
         <p:nvPicPr>
-          <p:cNvPr id="112" name="Picture 10" descr=""/>
+          <p:cNvPr id="114" name="Picture 10" descr=""/>
           <p:cNvPicPr/>
           <p:nvPr/>
         </p:nvPicPr>
@@ -8262,7 +8366,7 @@
         <p:spPr>
           <a:xfrm>
             <a:off x="1595160" y="1884960"/>
-            <a:ext cx="3663000" cy="4101840"/>
+            <a:ext cx="3662640" cy="4101480"/>
           </a:xfrm>
           <a:prstGeom prst="rect">
             <a:avLst/>
@@ -8323,14 +8427,14 @@
       </p:grpSpPr>
       <p:sp>
         <p:nvSpPr>
-          <p:cNvPr id="113" name="CustomShape 1"/>
-          <p:cNvSpPr/>
+          <p:cNvPr id="115" name="TextShape 1"/>
+          <p:cNvSpPr txBox="1"/>
           <p:nvPr/>
         </p:nvSpPr>
         <p:spPr>
           <a:xfrm>
-            <a:off x="2520000" y="288000"/>
-            <a:ext cx="7671960" cy="881280"/>
+            <a:off x="4248000" y="126720"/>
+            <a:ext cx="4248000" cy="881280"/>
           </a:xfrm>
           <a:prstGeom prst="rect">
             <a:avLst/>
@@ -8340,24 +8444,14 @@
             <a:noFill/>
           </a:ln>
         </p:spPr>
-        <p:style>
-          <a:lnRef idx="0"/>
-          <a:fillRef idx="0"/>
-          <a:effectRef idx="0"/>
-          <a:fontRef idx="minor"/>
-        </p:style>
         <p:txBody>
           <a:bodyPr lIns="90000" rIns="90000" tIns="45000" bIns="45000"/>
           <a:p>
-            <a:pPr algn="ctr">
-              <a:lnSpc>
-                <a:spcPct val="100000"/>
-              </a:lnSpc>
-            </a:pPr>
+            <a:pPr algn="ctr"/>
             <a:r>
-              <a:rPr b="0" lang="en-GB" sz="5100" spc="194" strike="noStrike" cap="all">
-                <a:solidFill>
-                  <a:srgbClr val="0b082e"/>
+              <a:rPr b="0" lang="en-GB" sz="5100" spc="-1" strike="noStrike">
+                <a:solidFill>
+                  <a:srgbClr val="000000"/>
                 </a:solidFill>
                 <a:uFill>
                   <a:solidFill>
@@ -8366,7 +8460,7 @@
                 </a:uFill>
                 <a:latin typeface="Impact"/>
               </a:rPr>
-              <a:t>LET’S GET STARTED! </a:t>
+              <a:t>REFERENCES</a:t>
             </a:r>
             <a:endParaRPr b="0" lang="en-GB" sz="5100" spc="-1" strike="noStrike">
               <a:solidFill>
@@ -8377,21 +8471,21 @@
                   <a:srgbClr val="ffffff"/>
                 </a:solidFill>
               </a:uFill>
-              <a:latin typeface="Arial"/>
+              <a:latin typeface="Impact"/>
             </a:endParaRPr>
           </a:p>
         </p:txBody>
       </p:sp>
       <p:sp>
         <p:nvSpPr>
-          <p:cNvPr id="114" name="CustomShape 2"/>
-          <p:cNvSpPr/>
+          <p:cNvPr id="116" name="TextShape 2"/>
+          <p:cNvSpPr txBox="1"/>
           <p:nvPr/>
         </p:nvSpPr>
         <p:spPr>
           <a:xfrm>
-            <a:off x="3456000" y="2469960"/>
-            <a:ext cx="5903640" cy="2137680"/>
+            <a:off x="2880000" y="1800000"/>
+            <a:ext cx="7344000" cy="3960000"/>
           </a:xfrm>
           <a:prstGeom prst="rect">
             <a:avLst/>
@@ -8401,19 +8495,10 @@
             <a:noFill/>
           </a:ln>
         </p:spPr>
-        <p:style>
-          <a:lnRef idx="0"/>
-          <a:fillRef idx="0"/>
-          <a:effectRef idx="0"/>
-          <a:fontRef idx="minor"/>
-        </p:style>
         <p:txBody>
           <a:bodyPr lIns="90000" rIns="90000" tIns="45000" bIns="45000"/>
           <a:p>
-            <a:pPr marL="216000" indent="-215640">
-              <a:lnSpc>
-                <a:spcPct val="100000"/>
-              </a:lnSpc>
+            <a:pPr marL="216000" indent="-216000">
               <a:buClr>
                 <a:srgbClr val="000000"/>
               </a:buClr>
@@ -8422,7 +8507,7 @@
               <a:buChar char=""/>
             </a:pPr>
             <a:r>
-              <a:rPr b="0" lang="en-GB" sz="1800" spc="-1" strike="noStrike">
+              <a:rPr b="0" lang="en-GB" sz="2400" spc="-1" strike="noStrike">
                 <a:solidFill>
                   <a:srgbClr val="000000"/>
                 </a:solidFill>
@@ -8431,42 +8516,45 @@
                     <a:srgbClr val="ffffff"/>
                   </a:solidFill>
                 </a:uFill>
-                <a:latin typeface="Arial"/>
+                <a:latin typeface="Gill Sans MT"/>
               </a:rPr>
-              <a:t>At least one working environment every 2 people.</a:t>
+              <a:t>Levy, Becca R., Pil H. Chung, and Martin D. Slade. "Influence of Valentine’s Day and Halloween on birth timing." Social Science &amp; Medicine 73, no. 8 (2011): 1246-1248.</a:t>
             </a:r>
-            <a:br/>
-            <a:r>
-              <a:rPr b="0" lang="en-GB" sz="1800" spc="-1" strike="noStrike">
-                <a:solidFill>
-                  <a:srgbClr val="000000"/>
-                </a:solidFill>
-                <a:uFill>
-                  <a:solidFill>
-                    <a:srgbClr val="ffffff"/>
-                  </a:solidFill>
-                </a:uFill>
-                <a:latin typeface="Arial"/>
-              </a:rPr>
-              <a:t> </a:t>
-            </a:r>
-            <a:endParaRPr b="0" lang="en-GB" sz="1800" spc="-1" strike="noStrike">
-              <a:solidFill>
-                <a:srgbClr val="000000"/>
-              </a:solidFill>
-              <a:uFill>
-                <a:solidFill>
-                  <a:srgbClr val="ffffff"/>
-                </a:solidFill>
-              </a:uFill>
-              <a:latin typeface="Arial"/>
-            </a:endParaRPr>
-          </a:p>
-          <a:p>
-            <a:pPr marL="216000" indent="-215640">
-              <a:lnSpc>
-                <a:spcPct val="100000"/>
-              </a:lnSpc>
+            <a:endParaRPr b="0" lang="en-GB" sz="2400" spc="-1" strike="noStrike">
+              <a:solidFill>
+                <a:srgbClr val="000000"/>
+              </a:solidFill>
+              <a:uFill>
+                <a:solidFill>
+                  <a:srgbClr val="ffffff"/>
+                </a:solidFill>
+              </a:uFill>
+              <a:latin typeface="Gill Sans MT"/>
+            </a:endParaRPr>
+          </a:p>
+          <a:p>
+            <a:pPr marL="216000" indent="-216000">
+              <a:buClr>
+                <a:srgbClr val="000000"/>
+              </a:buClr>
+              <a:buSzPct val="45000"/>
+              <a:buFont typeface="Wingdings" charset="2"/>
+              <a:buChar char=""/>
+            </a:pPr>
+            <a:endParaRPr b="0" lang="en-GB" sz="2400" spc="-1" strike="noStrike">
+              <a:solidFill>
+                <a:srgbClr val="000000"/>
+              </a:solidFill>
+              <a:uFill>
+                <a:solidFill>
+                  <a:srgbClr val="ffffff"/>
+                </a:solidFill>
+              </a:uFill>
+              <a:latin typeface="Gill Sans MT"/>
+            </a:endParaRPr>
+          </a:p>
+          <a:p>
+            <a:pPr marL="216000" indent="-216000">
               <a:buClr>
                 <a:srgbClr val="000000"/>
               </a:buClr>
@@ -8475,7 +8563,7 @@
               <a:buChar char=""/>
             </a:pPr>
             <a:r>
-              <a:rPr b="0" lang="en-GB" sz="1800" spc="-1" strike="noStrike">
+              <a:rPr b="0" lang="en-GB" sz="2400" spc="-1" strike="noStrike">
                 <a:solidFill>
                   <a:srgbClr val="000000"/>
                 </a:solidFill>
@@ -8484,20 +8572,76 @@
                     <a:srgbClr val="ffffff"/>
                   </a:solidFill>
                 </a:uFill>
-                <a:latin typeface="Arial"/>
+                <a:latin typeface="Gill Sans MT"/>
               </a:rPr>
-              <a:t>If not able to access the environment read from the html version or follow on the projector.</a:t>
+              <a:t>Gelman, Andrew, Hal S. Stern, John B. Carlin, David B. Dunson, Aki Vehtari, and Donald B. Rubin. Bayesian data analysis. Chapman and Hall/CRC, 2013.</a:t>
             </a:r>
-            <a:endParaRPr b="0" lang="en-GB" sz="1800" spc="-1" strike="noStrike">
-              <a:solidFill>
-                <a:srgbClr val="000000"/>
-              </a:solidFill>
-              <a:uFill>
-                <a:solidFill>
-                  <a:srgbClr val="ffffff"/>
-                </a:solidFill>
-              </a:uFill>
-              <a:latin typeface="Arial"/>
+            <a:endParaRPr b="0" lang="en-GB" sz="2400" spc="-1" strike="noStrike">
+              <a:solidFill>
+                <a:srgbClr val="000000"/>
+              </a:solidFill>
+              <a:uFill>
+                <a:solidFill>
+                  <a:srgbClr val="ffffff"/>
+                </a:solidFill>
+              </a:uFill>
+              <a:latin typeface="Gill Sans MT"/>
+            </a:endParaRPr>
+          </a:p>
+          <a:p>
+            <a:pPr marL="216000" indent="-216000">
+              <a:buClr>
+                <a:srgbClr val="000000"/>
+              </a:buClr>
+              <a:buSzPct val="45000"/>
+              <a:buFont typeface="Wingdings" charset="2"/>
+              <a:buChar char=""/>
+            </a:pPr>
+            <a:endParaRPr b="0" lang="en-GB" sz="2400" spc="-1" strike="noStrike">
+              <a:solidFill>
+                <a:srgbClr val="000000"/>
+              </a:solidFill>
+              <a:uFill>
+                <a:solidFill>
+                  <a:srgbClr val="ffffff"/>
+                </a:solidFill>
+              </a:uFill>
+              <a:latin typeface="Gill Sans MT"/>
+            </a:endParaRPr>
+          </a:p>
+          <a:p>
+            <a:pPr marL="216000" indent="-216000">
+              <a:buClr>
+                <a:srgbClr val="000000"/>
+              </a:buClr>
+              <a:buSzPct val="45000"/>
+              <a:buFont typeface="Wingdings" charset="2"/>
+              <a:buChar char=""/>
+            </a:pPr>
+            <a:r>
+              <a:rPr b="0" lang="en-GB" sz="2400" spc="-1" strike="noStrike">
+                <a:solidFill>
+                  <a:srgbClr val="000000"/>
+                </a:solidFill>
+                <a:uFill>
+                  <a:solidFill>
+                    <a:srgbClr val="ffffff"/>
+                  </a:solidFill>
+                </a:uFill>
+                <a:latin typeface="Gill Sans MT"/>
+              </a:rPr>
+              <a:t>https://www.youtube.com/watch?v=fc1hkFC2c1E</a:t>
+            </a:r>
+            <a:endParaRPr b="0" lang="en-GB" sz="2400" spc="-1" strike="noStrike">
+              <a:solidFill>
+                <a:srgbClr val="000000"/>
+              </a:solidFill>
+              <a:uFill>
+                <a:solidFill>
+                  <a:srgbClr val="ffffff"/>
+                </a:solidFill>
+              </a:uFill>
+              <a:latin typeface="Gill Sans MT"/>
             </a:endParaRPr>
           </a:p>
         </p:txBody>
@@ -8511,6 +8655,255 @@
           <p:childTnLst>
             <p:seq>
               <p:cTn id="14" nodeType="mainSeq"/>
+              <p:prevCondLst>
+                <p:cond delay="0" evt="onPrev">
+                  <p:tgtEl>
+                    <p:sldTgt/>
+                  </p:tgtEl>
+                </p:cond>
+              </p:prevCondLst>
+              <p:nextCondLst>
+                <p:cond delay="0" evt="onNext">
+                  <p:tgtEl>
+                    <p:sldTgt/>
+                  </p:tgtEl>
+                </p:cond>
+              </p:nextCondLst>
+            </p:seq>
+          </p:childTnLst>
+        </p:cTn>
+      </p:par>
+    </p:tnLst>
+  </p:timing>
+</p:sld>
+</file>
+
+<file path=ppt/slides/slide8.xml><?xml version="1.0" encoding="utf-8"?>
+<p:sld xmlns:a="http://schemas.openxmlformats.org/drawingml/2006/main" xmlns:p="http://schemas.openxmlformats.org/presentationml/2006/main" xmlns:r="http://schemas.openxmlformats.org/officeDocument/2006/relationships" xmlns:p14="http://schemas.microsoft.com/office/powerpoint/2010/main" xmlns:p15="http://schemas.microsoft.com/office/powerpoint/2012/main" xmlns:mc="http://schemas.openxmlformats.org/markup-compatibility/2006">
+  <p:cSld>
+    <p:spTree>
+      <p:nvGrpSpPr>
+        <p:cNvPr id="1" name=""/>
+        <p:cNvGrpSpPr/>
+        <p:nvPr/>
+      </p:nvGrpSpPr>
+      <p:grpSpPr>
+        <a:xfrm>
+          <a:off x="0" y="0"/>
+          <a:ext cx="0" cy="0"/>
+          <a:chOff x="0" y="0"/>
+          <a:chExt cx="0" cy="0"/>
+        </a:xfrm>
+      </p:grpSpPr>
+      <p:sp>
+        <p:nvSpPr>
+          <p:cNvPr id="117" name="CustomShape 1"/>
+          <p:cNvSpPr/>
+          <p:nvPr/>
+        </p:nvSpPr>
+        <p:spPr>
+          <a:xfrm>
+            <a:off x="2520000" y="288000"/>
+            <a:ext cx="7671600" cy="880920"/>
+          </a:xfrm>
+          <a:prstGeom prst="rect">
+            <a:avLst/>
+          </a:prstGeom>
+          <a:noFill/>
+          <a:ln>
+            <a:noFill/>
+          </a:ln>
+        </p:spPr>
+        <p:style>
+          <a:lnRef idx="0"/>
+          <a:fillRef idx="0"/>
+          <a:effectRef idx="0"/>
+          <a:fontRef idx="minor"/>
+        </p:style>
+        <p:txBody>
+          <a:bodyPr lIns="90000" rIns="90000" tIns="45000" bIns="45000"/>
+          <a:p>
+            <a:pPr algn="ctr">
+              <a:lnSpc>
+                <a:spcPct val="100000"/>
+              </a:lnSpc>
+            </a:pPr>
+            <a:r>
+              <a:rPr b="0" lang="en-GB" sz="5100" spc="191" strike="noStrike" cap="all">
+                <a:solidFill>
+                  <a:srgbClr val="0b082e"/>
+                </a:solidFill>
+                <a:uFill>
+                  <a:solidFill>
+                    <a:srgbClr val="ffffff"/>
+                  </a:solidFill>
+                </a:uFill>
+                <a:latin typeface="Impact"/>
+                <a:ea typeface="DejaVu Sans"/>
+              </a:rPr>
+              <a:t>LET’S GET STARTED! </a:t>
+            </a:r>
+            <a:endParaRPr b="0" lang="en-GB" sz="5100" spc="-1" strike="noStrike">
+              <a:solidFill>
+                <a:srgbClr val="000000"/>
+              </a:solidFill>
+              <a:uFill>
+                <a:solidFill>
+                  <a:srgbClr val="ffffff"/>
+                </a:solidFill>
+              </a:uFill>
+              <a:latin typeface="Arial"/>
+            </a:endParaRPr>
+          </a:p>
+        </p:txBody>
+      </p:sp>
+      <p:sp>
+        <p:nvSpPr>
+          <p:cNvPr id="118" name="CustomShape 2"/>
+          <p:cNvSpPr/>
+          <p:nvPr/>
+        </p:nvSpPr>
+        <p:spPr>
+          <a:xfrm>
+            <a:off x="3456000" y="2469960"/>
+            <a:ext cx="5903280" cy="2137320"/>
+          </a:xfrm>
+          <a:prstGeom prst="rect">
+            <a:avLst/>
+          </a:prstGeom>
+          <a:noFill/>
+          <a:ln>
+            <a:noFill/>
+          </a:ln>
+        </p:spPr>
+        <p:style>
+          <a:lnRef idx="0"/>
+          <a:fillRef idx="0"/>
+          <a:effectRef idx="0"/>
+          <a:fontRef idx="minor"/>
+        </p:style>
+        <p:txBody>
+          <a:bodyPr lIns="90000" rIns="90000" tIns="45000" bIns="45000"/>
+          <a:p>
+            <a:pPr marL="216000" indent="-215280">
+              <a:lnSpc>
+                <a:spcPct val="100000"/>
+              </a:lnSpc>
+              <a:buClr>
+                <a:srgbClr val="000000"/>
+              </a:buClr>
+              <a:buSzPct val="45000"/>
+              <a:buFont typeface="Wingdings" charset="2"/>
+              <a:buChar char=""/>
+            </a:pPr>
+            <a:r>
+              <a:rPr b="0" lang="en-GB" sz="2400" spc="-1" strike="noStrike">
+                <a:solidFill>
+                  <a:srgbClr val="000000"/>
+                </a:solidFill>
+                <a:uFill>
+                  <a:solidFill>
+                    <a:srgbClr val="ffffff"/>
+                  </a:solidFill>
+                </a:uFill>
+                <a:latin typeface="Gill Sans MT"/>
+                <a:ea typeface="DejaVu Sans"/>
+              </a:rPr>
+              <a:t>At least one working environment every 2 people.</a:t>
+            </a:r>
+            <a:br/>
+            <a:r>
+              <a:rPr b="0" lang="en-GB" sz="2400" spc="-1" strike="noStrike">
+                <a:solidFill>
+                  <a:srgbClr val="000000"/>
+                </a:solidFill>
+                <a:uFill>
+                  <a:solidFill>
+                    <a:srgbClr val="ffffff"/>
+                  </a:solidFill>
+                </a:uFill>
+                <a:latin typeface="Gill Sans MT"/>
+                <a:ea typeface="DejaVu Sans"/>
+              </a:rPr>
+              <a:t> </a:t>
+            </a:r>
+            <a:endParaRPr b="0" lang="en-GB" sz="2400" spc="-1" strike="noStrike">
+              <a:solidFill>
+                <a:srgbClr val="000000"/>
+              </a:solidFill>
+              <a:uFill>
+                <a:solidFill>
+                  <a:srgbClr val="ffffff"/>
+                </a:solidFill>
+              </a:uFill>
+              <a:latin typeface="Arial"/>
+            </a:endParaRPr>
+          </a:p>
+          <a:p>
+            <a:pPr marL="216000" indent="-215280">
+              <a:lnSpc>
+                <a:spcPct val="100000"/>
+              </a:lnSpc>
+              <a:buClr>
+                <a:srgbClr val="000000"/>
+              </a:buClr>
+              <a:buSzPct val="45000"/>
+              <a:buFont typeface="Wingdings" charset="2"/>
+              <a:buChar char=""/>
+            </a:pPr>
+            <a:r>
+              <a:rPr b="0" lang="en-GB" sz="2400" spc="-1" strike="noStrike">
+                <a:solidFill>
+                  <a:srgbClr val="000000"/>
+                </a:solidFill>
+                <a:uFill>
+                  <a:solidFill>
+                    <a:srgbClr val="ffffff"/>
+                  </a:solidFill>
+                </a:uFill>
+                <a:latin typeface="Gill Sans MT"/>
+                <a:ea typeface="DejaVu Sans"/>
+              </a:rPr>
+              <a:t>If not able to access the environment, read from the html version or follow on the projector</a:t>
+            </a:r>
+            <a:r>
+              <a:rPr b="0" lang="en-GB" sz="1800" spc="-1" strike="noStrike">
+                <a:solidFill>
+                  <a:srgbClr val="000000"/>
+                </a:solidFill>
+                <a:uFill>
+                  <a:solidFill>
+                    <a:srgbClr val="ffffff"/>
+                  </a:solidFill>
+                </a:uFill>
+                <a:latin typeface="Arial"/>
+                <a:ea typeface="DejaVu Sans"/>
+              </a:rPr>
+              <a:t>.</a:t>
+            </a:r>
+            <a:endParaRPr b="0" lang="en-GB" sz="1800" spc="-1" strike="noStrike">
+              <a:solidFill>
+                <a:srgbClr val="000000"/>
+              </a:solidFill>
+              <a:uFill>
+                <a:solidFill>
+                  <a:srgbClr val="ffffff"/>
+                </a:solidFill>
+              </a:uFill>
+              <a:latin typeface="Arial"/>
+            </a:endParaRPr>
+          </a:p>
+        </p:txBody>
+      </p:sp>
+    </p:spTree>
+  </p:cSld>
+  <p:timing>
+    <p:tnLst>
+      <p:par>
+        <p:cTn id="15" dur="indefinite" restart="never" nodeType="tmRoot">
+          <p:childTnLst>
+            <p:seq>
+              <p:cTn id="16" nodeType="mainSeq"/>
               <p:prevCondLst>
                 <p:cond delay="0" evt="onPrev">
                   <p:tgtEl>

</xml_diff>